<commit_message>
Added more potential slides to presentation slide show
</commit_message>
<xml_diff>
--- a/Project Presentation.pptx
+++ b/Project Presentation.pptx
@@ -11,9 +11,11 @@
     <p:sldId id="259" r:id="rId5"/>
     <p:sldId id="260" r:id="rId6"/>
     <p:sldId id="261" r:id="rId7"/>
-    <p:sldId id="262" r:id="rId8"/>
-    <p:sldId id="263" r:id="rId9"/>
-    <p:sldId id="264" r:id="rId10"/>
+    <p:sldId id="263" r:id="rId8"/>
+    <p:sldId id="264" r:id="rId9"/>
+    <p:sldId id="265" r:id="rId10"/>
+    <p:sldId id="266" r:id="rId11"/>
+    <p:sldId id="267" r:id="rId12"/>
   </p:sldIdLst>
   <p:sldSz cx="12192000" cy="6858000"/>
   <p:notesSz cx="6858000" cy="9144000"/>
@@ -6040,6 +6042,194 @@
 </p:sld>
 </file>
 
+<file path=ppt/slides/slide10.xml><?xml version="1.0" encoding="utf-8"?>
+<p:sld xmlns:a="http://schemas.openxmlformats.org/drawingml/2006/main" xmlns:r="http://schemas.openxmlformats.org/officeDocument/2006/relationships" xmlns:p="http://schemas.openxmlformats.org/presentationml/2006/main">
+  <p:cSld>
+    <p:spTree>
+      <p:nvGrpSpPr>
+        <p:cNvPr id="1" name=""/>
+        <p:cNvGrpSpPr/>
+        <p:nvPr/>
+      </p:nvGrpSpPr>
+      <p:grpSpPr>
+        <a:xfrm>
+          <a:off x="0" y="0"/>
+          <a:ext cx="0" cy="0"/>
+          <a:chOff x="0" y="0"/>
+          <a:chExt cx="0" cy="0"/>
+        </a:xfrm>
+      </p:grpSpPr>
+      <p:sp>
+        <p:nvSpPr>
+          <p:cNvPr id="4" name="Title 3"/>
+          <p:cNvSpPr>
+            <a:spLocks noGrp="1"/>
+          </p:cNvSpPr>
+          <p:nvPr>
+            <p:ph type="title"/>
+          </p:nvPr>
+        </p:nvSpPr>
+        <p:spPr/>
+        <p:txBody>
+          <a:bodyPr anchor="ctr"/>
+          <a:lstStyle/>
+          <a:p>
+            <a:pPr algn="ctr"/>
+            <a:r>
+              <a:rPr lang="en-US" dirty="0" err="1" smtClean="0"/>
+              <a:t>DeweyDecimal</a:t>
+            </a:r>
+            <a:r>
+              <a:rPr lang="en-US" dirty="0" err="1" smtClean="0"/>
+              <a:t>Class</a:t>
+            </a:r>
+            <a:endParaRPr lang="en-US" dirty="0"/>
+          </a:p>
+        </p:txBody>
+      </p:sp>
+      <p:sp>
+        <p:nvSpPr>
+          <p:cNvPr id="5" name="Content Placeholder 4"/>
+          <p:cNvSpPr>
+            <a:spLocks noGrp="1"/>
+          </p:cNvSpPr>
+          <p:nvPr>
+            <p:ph idx="1"/>
+          </p:nvPr>
+        </p:nvSpPr>
+        <p:spPr/>
+        <p:txBody>
+          <a:bodyPr/>
+          <a:lstStyle/>
+          <a:p>
+            <a:endParaRPr lang="en-US"/>
+          </a:p>
+        </p:txBody>
+      </p:sp>
+      <p:sp>
+        <p:nvSpPr>
+          <p:cNvPr id="6" name="Text Placeholder 5"/>
+          <p:cNvSpPr>
+            <a:spLocks noGrp="1"/>
+          </p:cNvSpPr>
+          <p:nvPr>
+            <p:ph type="body" sz="half" idx="2"/>
+          </p:nvPr>
+        </p:nvSpPr>
+        <p:spPr/>
+        <p:txBody>
+          <a:bodyPr/>
+          <a:lstStyle/>
+          <a:p>
+            <a:endParaRPr lang="en-US" dirty="0"/>
+          </a:p>
+        </p:txBody>
+      </p:sp>
+    </p:spTree>
+    <p:extLst>
+      <p:ext uri="{BB962C8B-B14F-4D97-AF65-F5344CB8AC3E}">
+        <p14:creationId xmlns:p14="http://schemas.microsoft.com/office/powerpoint/2010/main" val="2413118517"/>
+      </p:ext>
+    </p:extLst>
+  </p:cSld>
+  <p:clrMapOvr>
+    <a:masterClrMapping/>
+  </p:clrMapOvr>
+</p:sld>
+</file>
+
+<file path=ppt/slides/slide11.xml><?xml version="1.0" encoding="utf-8"?>
+<p:sld xmlns:a="http://schemas.openxmlformats.org/drawingml/2006/main" xmlns:r="http://schemas.openxmlformats.org/officeDocument/2006/relationships" xmlns:p="http://schemas.openxmlformats.org/presentationml/2006/main">
+  <p:cSld>
+    <p:spTree>
+      <p:nvGrpSpPr>
+        <p:cNvPr id="1" name=""/>
+        <p:cNvGrpSpPr/>
+        <p:nvPr/>
+      </p:nvGrpSpPr>
+      <p:grpSpPr>
+        <a:xfrm>
+          <a:off x="0" y="0"/>
+          <a:ext cx="0" cy="0"/>
+          <a:chOff x="0" y="0"/>
+          <a:chExt cx="0" cy="0"/>
+        </a:xfrm>
+      </p:grpSpPr>
+      <p:sp>
+        <p:nvSpPr>
+          <p:cNvPr id="4" name="Title 3"/>
+          <p:cNvSpPr>
+            <a:spLocks noGrp="1"/>
+          </p:cNvSpPr>
+          <p:nvPr>
+            <p:ph type="title"/>
+          </p:nvPr>
+        </p:nvSpPr>
+        <p:spPr/>
+        <p:txBody>
+          <a:bodyPr anchor="ctr"/>
+          <a:lstStyle/>
+          <a:p>
+            <a:pPr algn="ctr"/>
+            <a:r>
+              <a:rPr lang="en-US" dirty="0" smtClean="0"/>
+              <a:t>Still to Come</a:t>
+            </a:r>
+            <a:endParaRPr lang="en-US" dirty="0"/>
+          </a:p>
+        </p:txBody>
+      </p:sp>
+      <p:sp>
+        <p:nvSpPr>
+          <p:cNvPr id="5" name="Content Placeholder 4"/>
+          <p:cNvSpPr>
+            <a:spLocks noGrp="1"/>
+          </p:cNvSpPr>
+          <p:nvPr>
+            <p:ph idx="1"/>
+          </p:nvPr>
+        </p:nvSpPr>
+        <p:spPr/>
+        <p:txBody>
+          <a:bodyPr/>
+          <a:lstStyle/>
+          <a:p>
+            <a:endParaRPr lang="en-US"/>
+          </a:p>
+        </p:txBody>
+      </p:sp>
+      <p:sp>
+        <p:nvSpPr>
+          <p:cNvPr id="6" name="Text Placeholder 5"/>
+          <p:cNvSpPr>
+            <a:spLocks noGrp="1"/>
+          </p:cNvSpPr>
+          <p:nvPr>
+            <p:ph type="body" sz="half" idx="2"/>
+          </p:nvPr>
+        </p:nvSpPr>
+        <p:spPr/>
+        <p:txBody>
+          <a:bodyPr/>
+          <a:lstStyle/>
+          <a:p>
+            <a:endParaRPr lang="en-US" dirty="0"/>
+          </a:p>
+        </p:txBody>
+      </p:sp>
+    </p:spTree>
+    <p:extLst>
+      <p:ext uri="{BB962C8B-B14F-4D97-AF65-F5344CB8AC3E}">
+        <p14:creationId xmlns:p14="http://schemas.microsoft.com/office/powerpoint/2010/main" val="2140383251"/>
+      </p:ext>
+    </p:extLst>
+  </p:cSld>
+  <p:clrMapOvr>
+    <a:masterClrMapping/>
+  </p:clrMapOvr>
+</p:sld>
+</file>
+
 <file path=ppt/slides/slide2.xml><?xml version="1.0" encoding="utf-8"?>
 <p:sld xmlns:a="http://schemas.openxmlformats.org/drawingml/2006/main" xmlns:r="http://schemas.openxmlformats.org/officeDocument/2006/relationships" xmlns:p="http://schemas.openxmlformats.org/presentationml/2006/main">
   <p:cSld>
@@ -6569,19 +6759,15 @@
           <a:p>
             <a:pPr algn="ctr"/>
             <a:r>
-              <a:rPr lang="en-US" dirty="0" err="1" smtClean="0"/>
-              <a:t>MeerkroDB</a:t>
-            </a:r>
-            <a:r>
               <a:rPr lang="en-US" dirty="0" smtClean="0"/>
-              <a:t>:</a:t>
+              <a:t>Bootstrap:</a:t>
             </a:r>
             <a:br>
               <a:rPr lang="en-US" dirty="0" smtClean="0"/>
             </a:br>
             <a:r>
               <a:rPr lang="en-US" dirty="0" smtClean="0"/>
-              <a:t>Transactions</a:t>
+              <a:t>Columniation</a:t>
             </a:r>
             <a:endParaRPr lang="en-US" dirty="0"/>
           </a:p>
@@ -6628,7 +6814,7 @@
     </p:spTree>
     <p:extLst>
       <p:ext uri="{BB962C8B-B14F-4D97-AF65-F5344CB8AC3E}">
-        <p14:creationId xmlns:p14="http://schemas.microsoft.com/office/powerpoint/2010/main" val="411419055"/>
+        <p14:creationId xmlns:p14="http://schemas.microsoft.com/office/powerpoint/2010/main" val="1438647864"/>
       </p:ext>
     </p:extLst>
   </p:cSld>
@@ -6672,15 +6858,12 @@
           <a:p>
             <a:pPr algn="ctr"/>
             <a:r>
+              <a:rPr lang="en-US" smtClean="0"/>
+              <a:t>Font </a:t>
+            </a:r>
+            <a:r>
               <a:rPr lang="en-US" dirty="0" smtClean="0"/>
-              <a:t>Bootstrap:</a:t>
-            </a:r>
-            <a:br>
-              <a:rPr lang="en-US" dirty="0" smtClean="0"/>
-            </a:br>
-            <a:r>
-              <a:rPr lang="en-US" dirty="0" smtClean="0"/>
-              <a:t>Columniation</a:t>
+              <a:t>Awesome</a:t>
             </a:r>
             <a:endParaRPr lang="en-US" dirty="0"/>
           </a:p>
@@ -6727,7 +6910,7 @@
     </p:spTree>
     <p:extLst>
       <p:ext uri="{BB962C8B-B14F-4D97-AF65-F5344CB8AC3E}">
-        <p14:creationId xmlns:p14="http://schemas.microsoft.com/office/powerpoint/2010/main" val="1438647864"/>
+        <p14:creationId xmlns:p14="http://schemas.microsoft.com/office/powerpoint/2010/main" val="3814727283"/>
       </p:ext>
     </p:extLst>
   </p:cSld>
@@ -6771,12 +6954,8 @@
           <a:p>
             <a:pPr algn="ctr"/>
             <a:r>
-              <a:rPr lang="en-US" smtClean="0"/>
-              <a:t>Font </a:t>
-            </a:r>
-            <a:r>
               <a:rPr lang="en-US" dirty="0" smtClean="0"/>
-              <a:t>Awesome</a:t>
+              <a:t>Pagination</a:t>
             </a:r>
             <a:endParaRPr lang="en-US" dirty="0"/>
           </a:p>
@@ -6823,7 +7002,7 @@
     </p:spTree>
     <p:extLst>
       <p:ext uri="{BB962C8B-B14F-4D97-AF65-F5344CB8AC3E}">
-        <p14:creationId xmlns:p14="http://schemas.microsoft.com/office/powerpoint/2010/main" val="3814727283"/>
+        <p14:creationId xmlns:p14="http://schemas.microsoft.com/office/powerpoint/2010/main" val="2413118517"/>
       </p:ext>
     </p:extLst>
   </p:cSld>
@@ -7092,7 +7271,7 @@
   <a:extraClrSchemeLst/>
   <a:extLst>
     <a:ext uri="{05A4C25C-085E-4340-85A3-A5531E510DB2}">
-      <thm15:themeFamily xmlns:thm15="http://schemas.microsoft.com/office/thememl/2012/main" name="Ion" id="{B8441ADB-2E43-4AF7-B97A-BD870242C6A8}" vid="{BACC050B-8757-4460-95D8-E37B46A6B421}"/>
+      <thm15:themeFamily xmlns:thm15="http://schemas.microsoft.com/office/thememl/2012/main" xmlns="" name="Ion" id="{B8441ADB-2E43-4AF7-B97A-BD870242C6A8}" vid="{BACC050B-8757-4460-95D8-E37B46A6B421}"/>
     </a:ext>
   </a:extLst>
 </a:theme>

</xml_diff>